<commit_message>
Atualiza teclas de atalho
</commit_message>
<xml_diff>
--- a/docs/Guia de Referência do Plenus.pptx
+++ b/docs/Guia de Referência do Plenus.pptx
@@ -208,7 +208,7 @@
           <a:p>
             <a:fld id="{3D060ECF-CBFF-4E87-AE05-0EAEAEF78ABB}" type="datetimeFigureOut">
               <a:rPr lang="en-US" smtClean="0"/>
-              <a:t>6/14/2020</a:t>
+              <a:t>6/15/2020</a:t>
             </a:fld>
             <a:endParaRPr lang="en-US"/>
           </a:p>
@@ -690,7 +690,7 @@
           <a:p>
             <a:fld id="{85FBCF79-1A53-314F-AB67-C017019F1ABA}" type="datetimeFigureOut">
               <a:rPr lang="en-US" noProof="0" smtClean="0"/>
-              <a:t>6/14/2020</a:t>
+              <a:t>6/15/2020</a:t>
             </a:fld>
             <a:endParaRPr lang="en-US" noProof="0"/>
           </a:p>
@@ -860,7 +860,7 @@
           <a:p>
             <a:fld id="{85FBCF79-1A53-314F-AB67-C017019F1ABA}" type="datetimeFigureOut">
               <a:rPr lang="en-US" noProof="0" smtClean="0"/>
-              <a:t>6/14/2020</a:t>
+              <a:t>6/15/2020</a:t>
             </a:fld>
             <a:endParaRPr lang="en-US" noProof="0"/>
           </a:p>
@@ -1040,7 +1040,7 @@
           <a:p>
             <a:fld id="{85FBCF79-1A53-314F-AB67-C017019F1ABA}" type="datetimeFigureOut">
               <a:rPr lang="en-US" noProof="0" smtClean="0"/>
-              <a:t>6/14/2020</a:t>
+              <a:t>6/15/2020</a:t>
             </a:fld>
             <a:endParaRPr lang="en-US" noProof="0"/>
           </a:p>
@@ -1210,7 +1210,7 @@
           <a:p>
             <a:fld id="{85FBCF79-1A53-314F-AB67-C017019F1ABA}" type="datetimeFigureOut">
               <a:rPr lang="en-US" noProof="0" smtClean="0"/>
-              <a:t>6/14/2020</a:t>
+              <a:t>6/15/2020</a:t>
             </a:fld>
             <a:endParaRPr lang="en-US" noProof="0"/>
           </a:p>
@@ -1454,7 +1454,7 @@
           <a:p>
             <a:fld id="{85FBCF79-1A53-314F-AB67-C017019F1ABA}" type="datetimeFigureOut">
               <a:rPr lang="en-US" noProof="0" smtClean="0"/>
-              <a:t>6/14/2020</a:t>
+              <a:t>6/15/2020</a:t>
             </a:fld>
             <a:endParaRPr lang="en-US" noProof="0"/>
           </a:p>
@@ -1686,7 +1686,7 @@
           <a:p>
             <a:fld id="{85FBCF79-1A53-314F-AB67-C017019F1ABA}" type="datetimeFigureOut">
               <a:rPr lang="en-US" noProof="0" smtClean="0"/>
-              <a:t>6/14/2020</a:t>
+              <a:t>6/15/2020</a:t>
             </a:fld>
             <a:endParaRPr lang="en-US" noProof="0"/>
           </a:p>
@@ -2053,7 +2053,7 @@
           <a:p>
             <a:fld id="{85FBCF79-1A53-314F-AB67-C017019F1ABA}" type="datetimeFigureOut">
               <a:rPr lang="en-US" noProof="0" smtClean="0"/>
-              <a:t>6/14/2020</a:t>
+              <a:t>6/15/2020</a:t>
             </a:fld>
             <a:endParaRPr lang="en-US" noProof="0"/>
           </a:p>
@@ -2171,7 +2171,7 @@
           <a:p>
             <a:fld id="{85FBCF79-1A53-314F-AB67-C017019F1ABA}" type="datetimeFigureOut">
               <a:rPr lang="en-US" noProof="0" smtClean="0"/>
-              <a:t>6/14/2020</a:t>
+              <a:t>6/15/2020</a:t>
             </a:fld>
             <a:endParaRPr lang="en-US" noProof="0"/>
           </a:p>
@@ -2266,7 +2266,7 @@
           <a:p>
             <a:fld id="{85FBCF79-1A53-314F-AB67-C017019F1ABA}" type="datetimeFigureOut">
               <a:rPr lang="en-US" noProof="0" smtClean="0"/>
-              <a:t>6/14/2020</a:t>
+              <a:t>6/15/2020</a:t>
             </a:fld>
             <a:endParaRPr lang="en-US" noProof="0"/>
           </a:p>
@@ -2543,7 +2543,7 @@
           <a:p>
             <a:fld id="{85FBCF79-1A53-314F-AB67-C017019F1ABA}" type="datetimeFigureOut">
               <a:rPr lang="en-US" noProof="0" smtClean="0"/>
-              <a:t>6/14/2020</a:t>
+              <a:t>6/15/2020</a:t>
             </a:fld>
             <a:endParaRPr lang="en-US" noProof="0"/>
           </a:p>
@@ -2800,7 +2800,7 @@
           <a:p>
             <a:fld id="{85FBCF79-1A53-314F-AB67-C017019F1ABA}" type="datetimeFigureOut">
               <a:rPr lang="en-US" noProof="0" smtClean="0"/>
-              <a:t>6/14/2020</a:t>
+              <a:t>6/15/2020</a:t>
             </a:fld>
             <a:endParaRPr lang="en-US" noProof="0"/>
           </a:p>
@@ -3013,7 +3013,7 @@
           <a:p>
             <a:fld id="{85FBCF79-1A53-314F-AB67-C017019F1ABA}" type="datetimeFigureOut">
               <a:rPr lang="en-US" noProof="0" smtClean="0"/>
-              <a:t>6/14/2020</a:t>
+              <a:t>6/15/2020</a:t>
             </a:fld>
             <a:endParaRPr lang="en-US" noProof="0"/>
           </a:p>
@@ -4162,7 +4162,7 @@
         <p:spPr>
           <a:xfrm>
             <a:off x="1827329" y="3447553"/>
-            <a:ext cx="1729159" cy="1323439"/>
+            <a:ext cx="2240280" cy="1323439"/>
           </a:xfrm>
           <a:prstGeom prst="rect">
             <a:avLst/>
@@ -4236,7 +4236,7 @@
               <a:rPr lang="pt-BR" sz="1200" dirty="0">
                 <a:latin typeface="Segoe UI Light" panose="020B0502040204020203" pitchFamily="34" charset="0"/>
               </a:rPr>
-              <a:t>Limpa a tela</a:t>
+              <a:t>Mostra quatro janelas em uma</a:t>
             </a:r>
           </a:p>
         </p:txBody>
@@ -16465,8 +16465,8 @@
         </p:nvSpPr>
         <p:spPr>
           <a:xfrm>
-            <a:off x="4930330" y="4427752"/>
-            <a:ext cx="372376" cy="313740"/>
+            <a:off x="4891861" y="4427752"/>
+            <a:ext cx="426085" cy="313740"/>
           </a:xfrm>
           <a:prstGeom prst="rect">
             <a:avLst/>
@@ -16491,7 +16491,7 @@
                 </a:solidFill>
                 <a:latin typeface="Segoe UI Light" panose="020B0502040204020203" pitchFamily="34" charset="0"/>
               </a:rPr>
-              <a:t>Alt</a:t>
+              <a:t>Shift</a:t>
             </a:r>
           </a:p>
         </p:txBody>
@@ -16511,7 +16511,7 @@
         <p:spPr>
           <a:xfrm>
             <a:off x="5395405" y="4419834"/>
-            <a:ext cx="236021" cy="313740"/>
+            <a:ext cx="365905" cy="313740"/>
           </a:xfrm>
           <a:prstGeom prst="rect">
             <a:avLst/>
@@ -16536,7 +16536,7 @@
                 </a:solidFill>
                 <a:latin typeface="Segoe UI Light" panose="020B0502040204020203" pitchFamily="34" charset="0"/>
               </a:rPr>
-              <a:t>Q</a:t>
+              <a:t>F4</a:t>
             </a:r>
           </a:p>
         </p:txBody>
@@ -17300,23 +17300,6 @@
 </file>
 
 <file path=customXml/item1.xml><?xml version="1.0" encoding="utf-8"?>
-<p:properties xmlns:p="http://schemas.microsoft.com/office/2006/metadata/properties" xmlns:xsi="http://www.w3.org/2001/XMLSchema-instance" xmlns:pc="http://schemas.microsoft.com/office/infopath/2007/PartnerControls">
-  <documentManagement>
-    <MediaServiceKeyPoints xmlns="71af3243-3dd4-4a8d-8c0d-dd76da1f02a5" xsi:nil="true"/>
-  </documentManagement>
-</p:properties>
-</file>
-
-<file path=customXml/item2.xml><?xml version="1.0" encoding="utf-8"?>
-<?mso-contentType ?>
-<FormTemplates xmlns="http://schemas.microsoft.com/sharepoint/v3/contenttype/forms">
-  <Display>DocumentLibraryForm</Display>
-  <Edit>DocumentLibraryForm</Edit>
-  <New>DocumentLibraryForm</New>
-</FormTemplates>
-</file>
-
-<file path=customXml/item3.xml><?xml version="1.0" encoding="utf-8"?>
 <ct:contentTypeSchema xmlns:ct="http://schemas.microsoft.com/office/2006/metadata/contentType" xmlns:ma="http://schemas.microsoft.com/office/2006/metadata/properties/metaAttributes" ct:_="" ma:_="" ma:contentTypeName="Document" ma:contentTypeID="0x01010079F111ED35F8CC479449609E8A0923A6" ma:contentTypeVersion="11" ma:contentTypeDescription="Create a new document." ma:contentTypeScope="" ma:versionID="1c2eb7a32e66fb6e4260f3771546a5e2">
   <xsd:schema xmlns:xsd="http://www.w3.org/2001/XMLSchema" xmlns:xs="http://www.w3.org/2001/XMLSchema" xmlns:p="http://schemas.microsoft.com/office/2006/metadata/properties" xmlns:ns2="71af3243-3dd4-4a8d-8c0d-dd76da1f02a5" xmlns:ns3="16c05727-aa75-4e4a-9b5f-8a80a1165891" targetNamespace="http://schemas.microsoft.com/office/2006/metadata/properties" ma:root="true" ma:fieldsID="04e1f6479c48b08974ba73b5ca973489" ns2:_="" ns3:_="">
     <xsd:import namespace="71af3243-3dd4-4a8d-8c0d-dd76da1f02a5"/>
@@ -17527,32 +17510,24 @@
 </ct:contentTypeSchema>
 </file>
 
-<file path=customXml/itemProps1.xml><?xml version="1.0" encoding="utf-8"?>
-<ds:datastoreItem xmlns:ds="http://schemas.openxmlformats.org/officeDocument/2006/customXml" ds:itemID="{C608F9CD-C51D-4F60-87ED-726663F0A5A5}">
-  <ds:schemaRefs>
-    <ds:schemaRef ds:uri="http://purl.org/dc/elements/1.1/"/>
-    <ds:schemaRef ds:uri="http://schemas.microsoft.com/office/2006/metadata/properties"/>
-    <ds:schemaRef ds:uri="http://schemas.microsoft.com/office/infopath/2007/PartnerControls"/>
-    <ds:schemaRef ds:uri="http://purl.org/dc/dcmitype/"/>
-    <ds:schemaRef ds:uri="http://schemas.microsoft.com/office/2006/documentManagement/types"/>
-    <ds:schemaRef ds:uri="http://purl.org/dc/terms/"/>
-    <ds:schemaRef ds:uri="http://schemas.openxmlformats.org/package/2006/metadata/core-properties"/>
-    <ds:schemaRef ds:uri="16c05727-aa75-4e4a-9b5f-8a80a1165891"/>
-    <ds:schemaRef ds:uri="71af3243-3dd4-4a8d-8c0d-dd76da1f02a5"/>
-    <ds:schemaRef ds:uri="http://www.w3.org/XML/1998/namespace"/>
-  </ds:schemaRefs>
-</ds:datastoreItem>
+<file path=customXml/item2.xml><?xml version="1.0" encoding="utf-8"?>
+<?mso-contentType ?>
+<FormTemplates xmlns="http://schemas.microsoft.com/sharepoint/v3/contenttype/forms">
+  <Display>DocumentLibraryForm</Display>
+  <Edit>DocumentLibraryForm</Edit>
+  <New>DocumentLibraryForm</New>
+</FormTemplates>
 </file>
 
-<file path=customXml/itemProps2.xml><?xml version="1.0" encoding="utf-8"?>
-<ds:datastoreItem xmlns:ds="http://schemas.openxmlformats.org/officeDocument/2006/customXml" ds:itemID="{57A198F3-B33F-4126-A799-0DA12961373E}">
-  <ds:schemaRefs>
-    <ds:schemaRef ds:uri="http://schemas.microsoft.com/sharepoint/v3/contenttype/forms"/>
-  </ds:schemaRefs>
-</ds:datastoreItem>
+<file path=customXml/item3.xml><?xml version="1.0" encoding="utf-8"?>
+<p:properties xmlns:p="http://schemas.microsoft.com/office/2006/metadata/properties" xmlns:xsi="http://www.w3.org/2001/XMLSchema-instance" xmlns:pc="http://schemas.microsoft.com/office/infopath/2007/PartnerControls">
+  <documentManagement>
+    <MediaServiceKeyPoints xmlns="71af3243-3dd4-4a8d-8c0d-dd76da1f02a5" xsi:nil="true"/>
+  </documentManagement>
+</p:properties>
 </file>
 
-<file path=customXml/itemProps3.xml><?xml version="1.0" encoding="utf-8"?>
+<file path=customXml/itemProps1.xml><?xml version="1.0" encoding="utf-8"?>
 <ds:datastoreItem xmlns:ds="http://schemas.openxmlformats.org/officeDocument/2006/customXml" ds:itemID="{31E4866A-6DE4-4320-8CE6-0763C55A1111}">
   <ds:schemaRefs>
     <ds:schemaRef ds:uri="http://schemas.microsoft.com/office/2006/metadata/contentType"/>
@@ -17569,4 +17544,29 @@
     <ds:schemaRef ds:uri="http://schemas.microsoft.com/internal/obd"/>
   </ds:schemaRefs>
 </ds:datastoreItem>
+</file>
+
+<file path=customXml/itemProps2.xml><?xml version="1.0" encoding="utf-8"?>
+<ds:datastoreItem xmlns:ds="http://schemas.openxmlformats.org/officeDocument/2006/customXml" ds:itemID="{57A198F3-B33F-4126-A799-0DA12961373E}">
+  <ds:schemaRefs>
+    <ds:schemaRef ds:uri="http://schemas.microsoft.com/sharepoint/v3/contenttype/forms"/>
+  </ds:schemaRefs>
+</ds:datastoreItem>
+</file>
+
+<file path=customXml/itemProps3.xml><?xml version="1.0" encoding="utf-8"?>
+<ds:datastoreItem xmlns:ds="http://schemas.openxmlformats.org/officeDocument/2006/customXml" ds:itemID="{C608F9CD-C51D-4F60-87ED-726663F0A5A5}">
+  <ds:schemaRefs>
+    <ds:schemaRef ds:uri="http://purl.org/dc/elements/1.1/"/>
+    <ds:schemaRef ds:uri="http://schemas.microsoft.com/office/2006/metadata/properties"/>
+    <ds:schemaRef ds:uri="http://schemas.microsoft.com/office/infopath/2007/PartnerControls"/>
+    <ds:schemaRef ds:uri="http://purl.org/dc/dcmitype/"/>
+    <ds:schemaRef ds:uri="http://schemas.microsoft.com/office/2006/documentManagement/types"/>
+    <ds:schemaRef ds:uri="http://purl.org/dc/terms/"/>
+    <ds:schemaRef ds:uri="http://schemas.openxmlformats.org/package/2006/metadata/core-properties"/>
+    <ds:schemaRef ds:uri="16c05727-aa75-4e4a-9b5f-8a80a1165891"/>
+    <ds:schemaRef ds:uri="71af3243-3dd4-4a8d-8c0d-dd76da1f02a5"/>
+    <ds:schemaRef ds:uri="http://www.w3.org/XML/1998/namespace"/>
+  </ds:schemaRefs>
+</ds:datastoreItem>
 </file>
</xml_diff>